<commit_message>
Validation examples, final version
</commit_message>
<xml_diff>
--- a/Doc/Prezentace-optimalizace.pptx
+++ b/Doc/Prezentace-optimalizace.pptx
@@ -7842,9 +7842,6 @@
               </a:rPr>
               <a:t>, atp.)</a:t>
             </a:r>
-            <a:endParaRPr lang="cs-CZ" sz="1000" dirty="0">
-              <a:latin typeface="Consolas" panose="020B0609020204030204" pitchFamily="49" charset="0"/>
-            </a:endParaRPr>
           </a:p>
         </p:txBody>
       </p:sp>
@@ -15581,7 +15578,7 @@
         <p:spPr>
           <a:xfrm>
             <a:off x="293105" y="4567333"/>
-            <a:ext cx="4088940" cy="830997"/>
+            <a:ext cx="6532879" cy="830997"/>
           </a:xfrm>
           <a:prstGeom prst="rect">
             <a:avLst/>
@@ -15630,6 +15627,20 @@
                 <a:cs typeface="Segoe UI" panose="020B0502040204020203" pitchFamily="34" charset="0"/>
               </a:rPr>
               <a:t>contextu</a:t>
+            </a:r>
+            <a:r>
+              <a:rPr lang="cs-CZ" sz="2000" dirty="0" smtClean="0">
+                <a:latin typeface="Segoe UI" panose="020B0502040204020203" pitchFamily="34" charset="0"/>
+                <a:cs typeface="Segoe UI" panose="020B0502040204020203" pitchFamily="34" charset="0"/>
+              </a:rPr>
+              <a:t> při práci s </a:t>
+            </a:r>
+            <a:r>
+              <a:rPr lang="cs-CZ" sz="2000" dirty="0" err="1" smtClean="0">
+                <a:latin typeface="Segoe UI" panose="020B0502040204020203" pitchFamily="34" charset="0"/>
+                <a:cs typeface="Segoe UI" panose="020B0502040204020203" pitchFamily="34" charset="0"/>
+              </a:rPr>
+              <a:t>EntityState</a:t>
             </a:r>
             <a:endParaRPr lang="cs-CZ" sz="2000" dirty="0" smtClean="0">
               <a:latin typeface="Consolas" panose="020B0609020204030204" pitchFamily="49" charset="0"/>

</xml_diff>